<commit_message>
presentation changes version next
</commit_message>
<xml_diff>
--- a/beHappy in English.pptx
+++ b/beHappy in English.pptx
@@ -14,7 +14,7 @@
     <p:sldId id="259" r:id="rId5"/>
     <p:sldId id="260" r:id="rId6"/>
     <p:sldId id="261" r:id="rId7"/>
-    <p:sldId id="262" r:id="rId8"/>
+    <p:sldId id="264" r:id="rId8"/>
     <p:sldId id="263" r:id="rId9"/>
   </p:sldIdLst>
   <p:sldSz cx="9144000" cy="5143500" type="screen16x9"/>
@@ -286,6 +286,873 @@
     </p:extLst>
   </p:cmAuthor>
 </p:cmAuthorLst>
+</file>
+
+<file path=ppt/charts/chart1.xml><?xml version="1.0" encoding="utf-8"?>
+<c:chartSpace xmlns:c="http://schemas.openxmlformats.org/drawingml/2006/chart" xmlns:a="http://schemas.openxmlformats.org/drawingml/2006/main" xmlns:r="http://schemas.openxmlformats.org/officeDocument/2006/relationships" xmlns:c16r2="http://schemas.microsoft.com/office/drawing/2015/06/chart">
+  <c:date1904 val="0"/>
+  <c:lang val="pl-PL"/>
+  <c:roundedCorners val="0"/>
+  <mc:AlternateContent xmlns:mc="http://schemas.openxmlformats.org/markup-compatibility/2006">
+    <mc:Choice xmlns:c14="http://schemas.microsoft.com/office/drawing/2007/8/2/chart" Requires="c14">
+      <c14:style val="102"/>
+    </mc:Choice>
+    <mc:Fallback>
+      <c:style val="2"/>
+    </mc:Fallback>
+  </mc:AlternateContent>
+  <c:chart>
+    <c:title>
+      <c:tx>
+        <c:rich>
+          <a:bodyPr rot="0" spcFirstLastPara="1" vertOverflow="ellipsis" vert="horz" wrap="square" anchor="ctr" anchorCtr="1"/>
+          <a:lstStyle/>
+          <a:p>
+            <a:pPr>
+              <a:defRPr sz="1400" b="0" i="0" u="none" strike="noStrike" kern="1200" spc="0" baseline="0">
+                <a:solidFill>
+                  <a:schemeClr val="tx1">
+                    <a:lumMod val="65000"/>
+                    <a:lumOff val="35000"/>
+                  </a:schemeClr>
+                </a:solidFill>
+                <a:latin typeface="+mn-lt"/>
+                <a:ea typeface="+mn-ea"/>
+                <a:cs typeface="+mn-cs"/>
+              </a:defRPr>
+            </a:pPr>
+            <a:r>
+              <a:rPr lang="pl-PL" baseline="0" dirty="0"/>
+              <a:t>Ratio of data </a:t>
+            </a:r>
+            <a:r>
+              <a:rPr lang="pl-PL" baseline="0" dirty="0" err="1"/>
+              <a:t>used</a:t>
+            </a:r>
+            <a:r>
+              <a:rPr lang="pl-PL" baseline="0" dirty="0"/>
+              <a:t> in AI </a:t>
+            </a:r>
+            <a:r>
+              <a:rPr lang="pl-PL" baseline="0" dirty="0" err="1"/>
+              <a:t>teaching</a:t>
+            </a:r>
+            <a:endParaRPr lang="pl-PL" baseline="0" dirty="0"/>
+          </a:p>
+        </c:rich>
+      </c:tx>
+      <c:overlay val="0"/>
+      <c:spPr>
+        <a:noFill/>
+        <a:ln>
+          <a:noFill/>
+        </a:ln>
+        <a:effectLst/>
+      </c:spPr>
+      <c:txPr>
+        <a:bodyPr rot="0" spcFirstLastPara="1" vertOverflow="ellipsis" vert="horz" wrap="square" anchor="ctr" anchorCtr="1"/>
+        <a:lstStyle/>
+        <a:p>
+          <a:pPr>
+            <a:defRPr sz="1400" b="0" i="0" u="none" strike="noStrike" kern="1200" spc="0" baseline="0">
+              <a:solidFill>
+                <a:schemeClr val="tx1">
+                  <a:lumMod val="65000"/>
+                  <a:lumOff val="35000"/>
+                </a:schemeClr>
+              </a:solidFill>
+              <a:latin typeface="+mn-lt"/>
+              <a:ea typeface="+mn-ea"/>
+              <a:cs typeface="+mn-cs"/>
+            </a:defRPr>
+          </a:pPr>
+          <a:endParaRPr lang="en-US"/>
+        </a:p>
+      </c:txPr>
+    </c:title>
+    <c:autoTitleDeleted val="0"/>
+    <c:plotArea>
+      <c:layout/>
+      <c:barChart>
+        <c:barDir val="col"/>
+        <c:grouping val="clustered"/>
+        <c:varyColors val="0"/>
+        <c:ser>
+          <c:idx val="0"/>
+          <c:order val="0"/>
+          <c:spPr>
+            <a:solidFill>
+              <a:schemeClr val="accent2"/>
+            </a:solidFill>
+            <a:ln>
+              <a:noFill/>
+            </a:ln>
+            <a:effectLst/>
+          </c:spPr>
+          <c:invertIfNegative val="0"/>
+          <c:dPt>
+            <c:idx val="0"/>
+            <c:invertIfNegative val="0"/>
+            <c:bubble3D val="0"/>
+            <c:spPr>
+              <a:solidFill>
+                <a:srgbClr val="EF3F3F"/>
+              </a:solidFill>
+              <a:ln>
+                <a:noFill/>
+              </a:ln>
+              <a:effectLst/>
+            </c:spPr>
+            <c:extLst>
+              <c:ext xmlns:c16="http://schemas.microsoft.com/office/drawing/2014/chart" uri="{C3380CC4-5D6E-409C-BE32-E72D297353CC}">
+                <c16:uniqueId val="{00000005-B26F-459E-A047-7E8F89823FD3}"/>
+              </c:ext>
+            </c:extLst>
+          </c:dPt>
+          <c:dPt>
+            <c:idx val="1"/>
+            <c:invertIfNegative val="0"/>
+            <c:bubble3D val="0"/>
+            <c:spPr>
+              <a:solidFill>
+                <a:srgbClr val="92D050"/>
+              </a:solidFill>
+              <a:ln>
+                <a:noFill/>
+              </a:ln>
+              <a:effectLst/>
+            </c:spPr>
+            <c:extLst>
+              <c:ext xmlns:c16="http://schemas.microsoft.com/office/drawing/2014/chart" uri="{C3380CC4-5D6E-409C-BE32-E72D297353CC}">
+                <c16:uniqueId val="{00000001-B26F-459E-A047-7E8F89823FD3}"/>
+              </c:ext>
+            </c:extLst>
+          </c:dPt>
+          <c:cat>
+            <c:strRef>
+              <c:f>Arkusz1!$A$2:$A$3</c:f>
+              <c:strCache>
+                <c:ptCount val="2"/>
+                <c:pt idx="0">
+                  <c:v>Toskyczne</c:v>
+                </c:pt>
+                <c:pt idx="1">
+                  <c:v>Nietoksyczne</c:v>
+                </c:pt>
+              </c:strCache>
+            </c:strRef>
+          </c:cat>
+          <c:val>
+            <c:numRef>
+              <c:f>Arkusz1!$B$2:$B$3</c:f>
+              <c:numCache>
+                <c:formatCode>General</c:formatCode>
+                <c:ptCount val="2"/>
+                <c:pt idx="0">
+                  <c:v>24153</c:v>
+                </c:pt>
+                <c:pt idx="1">
+                  <c:v>32592</c:v>
+                </c:pt>
+              </c:numCache>
+            </c:numRef>
+          </c:val>
+          <c:extLst>
+            <c:ext xmlns:c16="http://schemas.microsoft.com/office/drawing/2014/chart" uri="{C3380CC4-5D6E-409C-BE32-E72D297353CC}">
+              <c16:uniqueId val="{00000002-B26F-459E-A047-7E8F89823FD3}"/>
+            </c:ext>
+          </c:extLst>
+        </c:ser>
+        <c:dLbls>
+          <c:showLegendKey val="0"/>
+          <c:showVal val="0"/>
+          <c:showCatName val="0"/>
+          <c:showSerName val="0"/>
+          <c:showPercent val="0"/>
+          <c:showBubbleSize val="0"/>
+        </c:dLbls>
+        <c:gapWidth val="219"/>
+        <c:overlap val="-27"/>
+        <c:axId val="450258680"/>
+        <c:axId val="450259336"/>
+      </c:barChart>
+      <c:catAx>
+        <c:axId val="450258680"/>
+        <c:scaling>
+          <c:orientation val="minMax"/>
+        </c:scaling>
+        <c:delete val="0"/>
+        <c:axPos val="b"/>
+        <c:numFmt formatCode="General" sourceLinked="1"/>
+        <c:majorTickMark val="none"/>
+        <c:minorTickMark val="none"/>
+        <c:tickLblPos val="nextTo"/>
+        <c:spPr>
+          <a:noFill/>
+          <a:ln w="9525" cap="flat" cmpd="sng" algn="ctr">
+            <a:solidFill>
+              <a:schemeClr val="tx1">
+                <a:lumMod val="15000"/>
+                <a:lumOff val="85000"/>
+              </a:schemeClr>
+            </a:solidFill>
+            <a:round/>
+          </a:ln>
+          <a:effectLst/>
+        </c:spPr>
+        <c:txPr>
+          <a:bodyPr rot="-60000000" spcFirstLastPara="1" vertOverflow="ellipsis" vert="horz" wrap="square" anchor="ctr" anchorCtr="1"/>
+          <a:lstStyle/>
+          <a:p>
+            <a:pPr>
+              <a:defRPr sz="900" b="0" i="0" u="none" strike="noStrike" kern="1200" baseline="0">
+                <a:solidFill>
+                  <a:schemeClr val="bg2"/>
+                </a:solidFill>
+                <a:latin typeface="Roboto" panose="02000000000000000000" pitchFamily="2" charset="0"/>
+                <a:ea typeface="+mn-ea"/>
+                <a:cs typeface="+mn-cs"/>
+              </a:defRPr>
+            </a:pPr>
+            <a:endParaRPr lang="en-US"/>
+          </a:p>
+        </c:txPr>
+        <c:crossAx val="450259336"/>
+        <c:crosses val="autoZero"/>
+        <c:auto val="1"/>
+        <c:lblAlgn val="ctr"/>
+        <c:lblOffset val="100"/>
+        <c:noMultiLvlLbl val="0"/>
+      </c:catAx>
+      <c:valAx>
+        <c:axId val="450259336"/>
+        <c:scaling>
+          <c:orientation val="minMax"/>
+        </c:scaling>
+        <c:delete val="0"/>
+        <c:axPos val="l"/>
+        <c:majorGridlines>
+          <c:spPr>
+            <a:ln w="9525" cap="flat" cmpd="sng" algn="ctr">
+              <a:solidFill>
+                <a:schemeClr val="tx1">
+                  <a:lumMod val="15000"/>
+                  <a:lumOff val="85000"/>
+                </a:schemeClr>
+              </a:solidFill>
+              <a:round/>
+            </a:ln>
+            <a:effectLst/>
+          </c:spPr>
+        </c:majorGridlines>
+        <c:numFmt formatCode="General" sourceLinked="1"/>
+        <c:majorTickMark val="none"/>
+        <c:minorTickMark val="none"/>
+        <c:tickLblPos val="nextTo"/>
+        <c:spPr>
+          <a:noFill/>
+          <a:ln>
+            <a:noFill/>
+          </a:ln>
+          <a:effectLst/>
+        </c:spPr>
+        <c:txPr>
+          <a:bodyPr rot="-60000000" spcFirstLastPara="1" vertOverflow="ellipsis" vert="horz" wrap="square" anchor="ctr" anchorCtr="1"/>
+          <a:lstStyle/>
+          <a:p>
+            <a:pPr>
+              <a:defRPr sz="900" b="0" i="0" u="none" strike="noStrike" kern="1200" baseline="0">
+                <a:solidFill>
+                  <a:schemeClr val="bg2"/>
+                </a:solidFill>
+                <a:latin typeface="Roboto" panose="02000000000000000000" pitchFamily="2" charset="0"/>
+                <a:ea typeface="+mn-ea"/>
+                <a:cs typeface="+mn-cs"/>
+              </a:defRPr>
+            </a:pPr>
+            <a:endParaRPr lang="en-US"/>
+          </a:p>
+        </c:txPr>
+        <c:crossAx val="450258680"/>
+        <c:crosses val="autoZero"/>
+        <c:crossBetween val="between"/>
+      </c:valAx>
+      <c:spPr>
+        <a:noFill/>
+        <a:ln>
+          <a:noFill/>
+        </a:ln>
+        <a:effectLst/>
+      </c:spPr>
+    </c:plotArea>
+    <c:plotVisOnly val="1"/>
+    <c:dispBlanksAs val="gap"/>
+    <c:showDLblsOverMax val="0"/>
+  </c:chart>
+  <c:spPr>
+    <a:noFill/>
+    <a:ln>
+      <a:noFill/>
+    </a:ln>
+    <a:effectLst/>
+  </c:spPr>
+  <c:txPr>
+    <a:bodyPr/>
+    <a:lstStyle/>
+    <a:p>
+      <a:pPr>
+        <a:defRPr/>
+      </a:pPr>
+      <a:endParaRPr lang="en-US"/>
+    </a:p>
+  </c:txPr>
+  <c:externalData r:id="rId3">
+    <c:autoUpdate val="0"/>
+  </c:externalData>
+</c:chartSpace>
+</file>
+
+<file path=ppt/charts/colors1.xml><?xml version="1.0" encoding="utf-8"?>
+<cs:colorStyle xmlns:cs="http://schemas.microsoft.com/office/drawing/2012/chartStyle" xmlns:a="http://schemas.openxmlformats.org/drawingml/2006/main" meth="cycle" id="10">
+  <a:schemeClr val="accent1"/>
+  <a:schemeClr val="accent2"/>
+  <a:schemeClr val="accent3"/>
+  <a:schemeClr val="accent4"/>
+  <a:schemeClr val="accent5"/>
+  <a:schemeClr val="accent6"/>
+  <cs:variation/>
+  <cs:variation>
+    <a:lumMod val="60000"/>
+  </cs:variation>
+  <cs:variation>
+    <a:lumMod val="80000"/>
+    <a:lumOff val="20000"/>
+  </cs:variation>
+  <cs:variation>
+    <a:lumMod val="80000"/>
+  </cs:variation>
+  <cs:variation>
+    <a:lumMod val="60000"/>
+    <a:lumOff val="40000"/>
+  </cs:variation>
+  <cs:variation>
+    <a:lumMod val="50000"/>
+  </cs:variation>
+  <cs:variation>
+    <a:lumMod val="70000"/>
+    <a:lumOff val="30000"/>
+  </cs:variation>
+  <cs:variation>
+    <a:lumMod val="70000"/>
+  </cs:variation>
+  <cs:variation>
+    <a:lumMod val="50000"/>
+    <a:lumOff val="50000"/>
+  </cs:variation>
+</cs:colorStyle>
+</file>
+
+<file path=ppt/charts/style1.xml><?xml version="1.0" encoding="utf-8"?>
+<cs:chartStyle xmlns:cs="http://schemas.microsoft.com/office/drawing/2012/chartStyle" xmlns:a="http://schemas.openxmlformats.org/drawingml/2006/main" id="201">
+  <cs:axisTitle>
+    <cs:lnRef idx="0"/>
+    <cs:fillRef idx="0"/>
+    <cs:effectRef idx="0"/>
+    <cs:fontRef idx="minor">
+      <a:schemeClr val="tx1">
+        <a:lumMod val="65000"/>
+        <a:lumOff val="35000"/>
+      </a:schemeClr>
+    </cs:fontRef>
+    <cs:defRPr sz="1000" kern="1200"/>
+  </cs:axisTitle>
+  <cs:categoryAxis>
+    <cs:lnRef idx="0"/>
+    <cs:fillRef idx="0"/>
+    <cs:effectRef idx="0"/>
+    <cs:fontRef idx="minor">
+      <a:schemeClr val="tx1">
+        <a:lumMod val="65000"/>
+        <a:lumOff val="35000"/>
+      </a:schemeClr>
+    </cs:fontRef>
+    <cs:spPr>
+      <a:ln w="9525" cap="flat" cmpd="sng" algn="ctr">
+        <a:solidFill>
+          <a:schemeClr val="tx1">
+            <a:lumMod val="15000"/>
+            <a:lumOff val="85000"/>
+          </a:schemeClr>
+        </a:solidFill>
+        <a:round/>
+      </a:ln>
+    </cs:spPr>
+    <cs:defRPr sz="900" kern="1200"/>
+  </cs:categoryAxis>
+  <cs:chartArea mods="allowNoFillOverride allowNoLineOverride">
+    <cs:lnRef idx="0"/>
+    <cs:fillRef idx="0"/>
+    <cs:effectRef idx="0"/>
+    <cs:fontRef idx="minor">
+      <a:schemeClr val="tx1"/>
+    </cs:fontRef>
+    <cs:spPr>
+      <a:solidFill>
+        <a:schemeClr val="bg1"/>
+      </a:solidFill>
+      <a:ln w="9525" cap="flat" cmpd="sng" algn="ctr">
+        <a:solidFill>
+          <a:schemeClr val="tx1">
+            <a:lumMod val="15000"/>
+            <a:lumOff val="85000"/>
+          </a:schemeClr>
+        </a:solidFill>
+        <a:round/>
+      </a:ln>
+    </cs:spPr>
+    <cs:defRPr sz="1000" kern="1200"/>
+  </cs:chartArea>
+  <cs:dataLabel>
+    <cs:lnRef idx="0"/>
+    <cs:fillRef idx="0"/>
+    <cs:effectRef idx="0"/>
+    <cs:fontRef idx="minor">
+      <a:schemeClr val="tx1">
+        <a:lumMod val="75000"/>
+        <a:lumOff val="25000"/>
+      </a:schemeClr>
+    </cs:fontRef>
+    <cs:defRPr sz="900" kern="1200"/>
+  </cs:dataLabel>
+  <cs:dataLabelCallout>
+    <cs:lnRef idx="0"/>
+    <cs:fillRef idx="0"/>
+    <cs:effectRef idx="0"/>
+    <cs:fontRef idx="minor">
+      <a:schemeClr val="dk1">
+        <a:lumMod val="65000"/>
+        <a:lumOff val="35000"/>
+      </a:schemeClr>
+    </cs:fontRef>
+    <cs:spPr>
+      <a:solidFill>
+        <a:schemeClr val="lt1"/>
+      </a:solidFill>
+      <a:ln>
+        <a:solidFill>
+          <a:schemeClr val="dk1">
+            <a:lumMod val="25000"/>
+            <a:lumOff val="75000"/>
+          </a:schemeClr>
+        </a:solidFill>
+      </a:ln>
+    </cs:spPr>
+    <cs:defRPr sz="900" kern="1200"/>
+    <cs:bodyPr rot="0" spcFirstLastPara="1" vertOverflow="clip" horzOverflow="clip" vert="horz" wrap="square" lIns="36576" tIns="18288" rIns="36576" bIns="18288" anchor="ctr" anchorCtr="1">
+      <a:spAutoFit/>
+    </cs:bodyPr>
+  </cs:dataLabelCallout>
+  <cs:dataPoint>
+    <cs:lnRef idx="0"/>
+    <cs:fillRef idx="1">
+      <cs:styleClr val="auto"/>
+    </cs:fillRef>
+    <cs:effectRef idx="0"/>
+    <cs:fontRef idx="minor">
+      <a:schemeClr val="tx1"/>
+    </cs:fontRef>
+  </cs:dataPoint>
+  <cs:dataPoint3D>
+    <cs:lnRef idx="0"/>
+    <cs:fillRef idx="1">
+      <cs:styleClr val="auto"/>
+    </cs:fillRef>
+    <cs:effectRef idx="0"/>
+    <cs:fontRef idx="minor">
+      <a:schemeClr val="tx1"/>
+    </cs:fontRef>
+  </cs:dataPoint3D>
+  <cs:dataPointLine>
+    <cs:lnRef idx="0">
+      <cs:styleClr val="auto"/>
+    </cs:lnRef>
+    <cs:fillRef idx="1"/>
+    <cs:effectRef idx="0"/>
+    <cs:fontRef idx="minor">
+      <a:schemeClr val="tx1"/>
+    </cs:fontRef>
+    <cs:spPr>
+      <a:ln w="28575" cap="rnd">
+        <a:solidFill>
+          <a:schemeClr val="phClr"/>
+        </a:solidFill>
+        <a:round/>
+      </a:ln>
+    </cs:spPr>
+  </cs:dataPointLine>
+  <cs:dataPointMarker>
+    <cs:lnRef idx="0">
+      <cs:styleClr val="auto"/>
+    </cs:lnRef>
+    <cs:fillRef idx="1">
+      <cs:styleClr val="auto"/>
+    </cs:fillRef>
+    <cs:effectRef idx="0"/>
+    <cs:fontRef idx="minor">
+      <a:schemeClr val="tx1"/>
+    </cs:fontRef>
+    <cs:spPr>
+      <a:ln w="9525">
+        <a:solidFill>
+          <a:schemeClr val="phClr"/>
+        </a:solidFill>
+      </a:ln>
+    </cs:spPr>
+  </cs:dataPointMarker>
+  <cs:dataPointMarkerLayout symbol="circle" size="5"/>
+  <cs:dataPointWireframe>
+    <cs:lnRef idx="0">
+      <cs:styleClr val="auto"/>
+    </cs:lnRef>
+    <cs:fillRef idx="1"/>
+    <cs:effectRef idx="0"/>
+    <cs:fontRef idx="minor">
+      <a:schemeClr val="tx1"/>
+    </cs:fontRef>
+    <cs:spPr>
+      <a:ln w="9525" cap="rnd">
+        <a:solidFill>
+          <a:schemeClr val="phClr"/>
+        </a:solidFill>
+        <a:round/>
+      </a:ln>
+    </cs:spPr>
+  </cs:dataPointWireframe>
+  <cs:dataTable>
+    <cs:lnRef idx="0"/>
+    <cs:fillRef idx="0"/>
+    <cs:effectRef idx="0"/>
+    <cs:fontRef idx="minor">
+      <a:schemeClr val="tx1">
+        <a:lumMod val="65000"/>
+        <a:lumOff val="35000"/>
+      </a:schemeClr>
+    </cs:fontRef>
+    <cs:spPr>
+      <a:noFill/>
+      <a:ln w="9525" cap="flat" cmpd="sng" algn="ctr">
+        <a:solidFill>
+          <a:schemeClr val="tx1">
+            <a:lumMod val="15000"/>
+            <a:lumOff val="85000"/>
+          </a:schemeClr>
+        </a:solidFill>
+        <a:round/>
+      </a:ln>
+    </cs:spPr>
+    <cs:defRPr sz="900" kern="1200"/>
+  </cs:dataTable>
+  <cs:downBar>
+    <cs:lnRef idx="0"/>
+    <cs:fillRef idx="0"/>
+    <cs:effectRef idx="0"/>
+    <cs:fontRef idx="minor">
+      <a:schemeClr val="dk1"/>
+    </cs:fontRef>
+    <cs:spPr>
+      <a:solidFill>
+        <a:schemeClr val="dk1">
+          <a:lumMod val="65000"/>
+          <a:lumOff val="35000"/>
+        </a:schemeClr>
+      </a:solidFill>
+      <a:ln w="9525">
+        <a:solidFill>
+          <a:schemeClr val="tx1">
+            <a:lumMod val="65000"/>
+            <a:lumOff val="35000"/>
+          </a:schemeClr>
+        </a:solidFill>
+      </a:ln>
+    </cs:spPr>
+  </cs:downBar>
+  <cs:dropLine>
+    <cs:lnRef idx="0"/>
+    <cs:fillRef idx="0"/>
+    <cs:effectRef idx="0"/>
+    <cs:fontRef idx="minor">
+      <a:schemeClr val="tx1"/>
+    </cs:fontRef>
+    <cs:spPr>
+      <a:ln w="9525" cap="flat" cmpd="sng" algn="ctr">
+        <a:solidFill>
+          <a:schemeClr val="tx1">
+            <a:lumMod val="35000"/>
+            <a:lumOff val="65000"/>
+          </a:schemeClr>
+        </a:solidFill>
+        <a:round/>
+      </a:ln>
+    </cs:spPr>
+  </cs:dropLine>
+  <cs:errorBar>
+    <cs:lnRef idx="0"/>
+    <cs:fillRef idx="0"/>
+    <cs:effectRef idx="0"/>
+    <cs:fontRef idx="minor">
+      <a:schemeClr val="tx1"/>
+    </cs:fontRef>
+    <cs:spPr>
+      <a:ln w="9525" cap="flat" cmpd="sng" algn="ctr">
+        <a:solidFill>
+          <a:schemeClr val="tx1">
+            <a:lumMod val="65000"/>
+            <a:lumOff val="35000"/>
+          </a:schemeClr>
+        </a:solidFill>
+        <a:round/>
+      </a:ln>
+    </cs:spPr>
+  </cs:errorBar>
+  <cs:floor>
+    <cs:lnRef idx="0"/>
+    <cs:fillRef idx="0"/>
+    <cs:effectRef idx="0"/>
+    <cs:fontRef idx="minor">
+      <a:schemeClr val="tx1"/>
+    </cs:fontRef>
+    <cs:spPr>
+      <a:noFill/>
+      <a:ln>
+        <a:noFill/>
+      </a:ln>
+    </cs:spPr>
+  </cs:floor>
+  <cs:gridlineMajor>
+    <cs:lnRef idx="0"/>
+    <cs:fillRef idx="0"/>
+    <cs:effectRef idx="0"/>
+    <cs:fontRef idx="minor">
+      <a:schemeClr val="tx1"/>
+    </cs:fontRef>
+    <cs:spPr>
+      <a:ln w="9525" cap="flat" cmpd="sng" algn="ctr">
+        <a:solidFill>
+          <a:schemeClr val="tx1">
+            <a:lumMod val="15000"/>
+            <a:lumOff val="85000"/>
+          </a:schemeClr>
+        </a:solidFill>
+        <a:round/>
+      </a:ln>
+    </cs:spPr>
+  </cs:gridlineMajor>
+  <cs:gridlineMinor>
+    <cs:lnRef idx="0"/>
+    <cs:fillRef idx="0"/>
+    <cs:effectRef idx="0"/>
+    <cs:fontRef idx="minor">
+      <a:schemeClr val="tx1"/>
+    </cs:fontRef>
+    <cs:spPr>
+      <a:ln w="9525" cap="flat" cmpd="sng" algn="ctr">
+        <a:solidFill>
+          <a:schemeClr val="tx1">
+            <a:lumMod val="5000"/>
+            <a:lumOff val="95000"/>
+          </a:schemeClr>
+        </a:solidFill>
+        <a:round/>
+      </a:ln>
+    </cs:spPr>
+  </cs:gridlineMinor>
+  <cs:hiLoLine>
+    <cs:lnRef idx="0"/>
+    <cs:fillRef idx="0"/>
+    <cs:effectRef idx="0"/>
+    <cs:fontRef idx="minor">
+      <a:schemeClr val="tx1"/>
+    </cs:fontRef>
+    <cs:spPr>
+      <a:ln w="9525" cap="flat" cmpd="sng" algn="ctr">
+        <a:solidFill>
+          <a:schemeClr val="tx1">
+            <a:lumMod val="75000"/>
+            <a:lumOff val="25000"/>
+          </a:schemeClr>
+        </a:solidFill>
+        <a:round/>
+      </a:ln>
+    </cs:spPr>
+  </cs:hiLoLine>
+  <cs:leaderLine>
+    <cs:lnRef idx="0"/>
+    <cs:fillRef idx="0"/>
+    <cs:effectRef idx="0"/>
+    <cs:fontRef idx="minor">
+      <a:schemeClr val="tx1"/>
+    </cs:fontRef>
+    <cs:spPr>
+      <a:ln w="9525" cap="flat" cmpd="sng" algn="ctr">
+        <a:solidFill>
+          <a:schemeClr val="tx1">
+            <a:lumMod val="35000"/>
+            <a:lumOff val="65000"/>
+          </a:schemeClr>
+        </a:solidFill>
+        <a:round/>
+      </a:ln>
+    </cs:spPr>
+  </cs:leaderLine>
+  <cs:legend>
+    <cs:lnRef idx="0"/>
+    <cs:fillRef idx="0"/>
+    <cs:effectRef idx="0"/>
+    <cs:fontRef idx="minor">
+      <a:schemeClr val="tx1">
+        <a:lumMod val="65000"/>
+        <a:lumOff val="35000"/>
+      </a:schemeClr>
+    </cs:fontRef>
+    <cs:defRPr sz="900" kern="1200"/>
+  </cs:legend>
+  <cs:plotArea mods="allowNoFillOverride allowNoLineOverride">
+    <cs:lnRef idx="0"/>
+    <cs:fillRef idx="0"/>
+    <cs:effectRef idx="0"/>
+    <cs:fontRef idx="minor">
+      <a:schemeClr val="tx1"/>
+    </cs:fontRef>
+  </cs:plotArea>
+  <cs:plotArea3D mods="allowNoFillOverride allowNoLineOverride">
+    <cs:lnRef idx="0"/>
+    <cs:fillRef idx="0"/>
+    <cs:effectRef idx="0"/>
+    <cs:fontRef idx="minor">
+      <a:schemeClr val="tx1"/>
+    </cs:fontRef>
+  </cs:plotArea3D>
+  <cs:seriesAxis>
+    <cs:lnRef idx="0"/>
+    <cs:fillRef idx="0"/>
+    <cs:effectRef idx="0"/>
+    <cs:fontRef idx="minor">
+      <a:schemeClr val="tx1">
+        <a:lumMod val="65000"/>
+        <a:lumOff val="35000"/>
+      </a:schemeClr>
+    </cs:fontRef>
+    <cs:defRPr sz="900" kern="1200"/>
+  </cs:seriesAxis>
+  <cs:seriesLine>
+    <cs:lnRef idx="0"/>
+    <cs:fillRef idx="0"/>
+    <cs:effectRef idx="0"/>
+    <cs:fontRef idx="minor">
+      <a:schemeClr val="tx1"/>
+    </cs:fontRef>
+    <cs:spPr>
+      <a:ln w="9525" cap="flat" cmpd="sng" algn="ctr">
+        <a:solidFill>
+          <a:schemeClr val="tx1">
+            <a:lumMod val="35000"/>
+            <a:lumOff val="65000"/>
+          </a:schemeClr>
+        </a:solidFill>
+        <a:round/>
+      </a:ln>
+    </cs:spPr>
+  </cs:seriesLine>
+  <cs:title>
+    <cs:lnRef idx="0"/>
+    <cs:fillRef idx="0"/>
+    <cs:effectRef idx="0"/>
+    <cs:fontRef idx="minor">
+      <a:schemeClr val="tx1">
+        <a:lumMod val="65000"/>
+        <a:lumOff val="35000"/>
+      </a:schemeClr>
+    </cs:fontRef>
+    <cs:defRPr sz="1400" b="0" kern="1200" spc="0" baseline="0"/>
+  </cs:title>
+  <cs:trendline>
+    <cs:lnRef idx="0">
+      <cs:styleClr val="auto"/>
+    </cs:lnRef>
+    <cs:fillRef idx="0"/>
+    <cs:effectRef idx="0"/>
+    <cs:fontRef idx="minor">
+      <a:schemeClr val="tx1"/>
+    </cs:fontRef>
+    <cs:spPr>
+      <a:ln w="19050" cap="rnd">
+        <a:solidFill>
+          <a:schemeClr val="phClr"/>
+        </a:solidFill>
+        <a:prstDash val="sysDot"/>
+      </a:ln>
+    </cs:spPr>
+  </cs:trendline>
+  <cs:trendlineLabel>
+    <cs:lnRef idx="0"/>
+    <cs:fillRef idx="0"/>
+    <cs:effectRef idx="0"/>
+    <cs:fontRef idx="minor">
+      <a:schemeClr val="tx1">
+        <a:lumMod val="65000"/>
+        <a:lumOff val="35000"/>
+      </a:schemeClr>
+    </cs:fontRef>
+    <cs:defRPr sz="900" kern="1200"/>
+  </cs:trendlineLabel>
+  <cs:upBar>
+    <cs:lnRef idx="0"/>
+    <cs:fillRef idx="0"/>
+    <cs:effectRef idx="0"/>
+    <cs:fontRef idx="minor">
+      <a:schemeClr val="dk1"/>
+    </cs:fontRef>
+    <cs:spPr>
+      <a:solidFill>
+        <a:schemeClr val="lt1"/>
+      </a:solidFill>
+      <a:ln w="9525">
+        <a:solidFill>
+          <a:schemeClr val="tx1">
+            <a:lumMod val="15000"/>
+            <a:lumOff val="85000"/>
+          </a:schemeClr>
+        </a:solidFill>
+      </a:ln>
+    </cs:spPr>
+  </cs:upBar>
+  <cs:valueAxis>
+    <cs:lnRef idx="0"/>
+    <cs:fillRef idx="0"/>
+    <cs:effectRef idx="0"/>
+    <cs:fontRef idx="minor">
+      <a:schemeClr val="tx1">
+        <a:lumMod val="65000"/>
+        <a:lumOff val="35000"/>
+      </a:schemeClr>
+    </cs:fontRef>
+    <cs:defRPr sz="900" kern="1200"/>
+  </cs:valueAxis>
+  <cs:wall>
+    <cs:lnRef idx="0"/>
+    <cs:fillRef idx="0"/>
+    <cs:effectRef idx="0"/>
+    <cs:fontRef idx="minor">
+      <a:schemeClr val="tx1"/>
+    </cs:fontRef>
+    <cs:spPr>
+      <a:noFill/>
+      <a:ln>
+        <a:noFill/>
+      </a:ln>
+    </cs:spPr>
+  </cs:wall>
+</cs:chartStyle>
 </file>
 
 <file path=ppt/comments/comment1.xml><?xml version="1.0" encoding="utf-8"?>
@@ -1396,7 +2263,7 @@
         </p:nvSpPr>
         <p:spPr>
           <a:xfrm>
-            <a:off x="381300" y="685800"/>
+            <a:off x="381000" y="685800"/>
             <a:ext cx="6096000" cy="3429000"/>
           </a:xfrm>
           <a:custGeom>
@@ -8452,6 +9319,45 @@
           </a:p>
         </p:txBody>
       </p:sp>
+      <p:sp>
+        <p:nvSpPr>
+          <p:cNvPr id="3" name="pole tekstowe 2">
+            <a:extLst>
+              <a:ext uri="{FF2B5EF4-FFF2-40B4-BE49-F238E27FC236}">
+                <a16:creationId xmlns:a16="http://schemas.microsoft.com/office/drawing/2014/main" id="{F075EE1C-3127-7B97-884A-D07D5A1C4851}"/>
+              </a:ext>
+            </a:extLst>
+          </p:cNvPr>
+          <p:cNvSpPr txBox="1"/>
+          <p:nvPr/>
+        </p:nvSpPr>
+        <p:spPr>
+          <a:xfrm>
+            <a:off x="5174901" y="4006430"/>
+            <a:ext cx="3645299" cy="523220"/>
+          </a:xfrm>
+          <a:prstGeom prst="rect">
+            <a:avLst/>
+          </a:prstGeom>
+          <a:noFill/>
+        </p:spPr>
+        <p:txBody>
+          <a:bodyPr wrap="square" rtlCol="0">
+            <a:spAutoFit/>
+          </a:bodyPr>
+          <a:lstStyle/>
+          <a:p>
+            <a:r>
+              <a:rPr lang="pl-PL" dirty="0">
+                <a:solidFill>
+                  <a:schemeClr val="bg1"/>
+                </a:solidFill>
+              </a:rPr>
+              <a:t>Zespół szkół nr 2 im. Eugeniusza Kwiatkowskiego w Dębicy</a:t>
+            </a:r>
+          </a:p>
+        </p:txBody>
+      </p:sp>
     </p:spTree>
   </p:cSld>
   <p:clrMapOvr>
@@ -8635,7 +9541,7 @@
               <a:buNone/>
             </a:pPr>
             <a:r>
-              <a:rPr lang="pl" sz="600">
+              <a:rPr lang="pl" sz="600" dirty="0">
                 <a:solidFill>
                   <a:schemeClr val="lt1"/>
                 </a:solidFill>
@@ -8644,9 +9550,9 @@
                 <a:cs typeface="Roboto"/>
                 <a:sym typeface="Roboto"/>
               </a:rPr>
-              <a:t>źródło: https://mycompanypolska.pl/</a:t>
-            </a:r>
-            <a:endParaRPr sz="600">
+              <a:t>source: https://mycompanypolska.pl/</a:t>
+            </a:r>
+            <a:endParaRPr sz="600" dirty="0">
               <a:solidFill>
                 <a:schemeClr val="lt1"/>
               </a:solidFill>
@@ -9045,15 +9951,41 @@
               <a:buNone/>
             </a:pPr>
             <a:r>
-              <a:rPr lang="pl" sz="600">
+              <a:rPr lang="pl" sz="600" dirty="0">
+                <a:solidFill>
+                  <a:schemeClr val="bg2">
+                    <a:lumMod val="50000"/>
+                  </a:schemeClr>
+                </a:solidFill>
                 <a:latin typeface="Roboto"/>
                 <a:ea typeface="Roboto"/>
                 <a:cs typeface="Roboto"/>
                 <a:sym typeface="Roboto"/>
               </a:rPr>
-              <a:t>źródło: https://www.casfera.pl/</a:t>
-            </a:r>
-            <a:endParaRPr sz="600">
+              <a:t>source</a:t>
+            </a:r>
+            <a:r>
+              <a:rPr lang="pl" sz="600" dirty="0">
+                <a:solidFill>
+                  <a:schemeClr val="lt1"/>
+                </a:solidFill>
+                <a:latin typeface="Roboto"/>
+                <a:ea typeface="Roboto"/>
+                <a:cs typeface="Roboto"/>
+                <a:sym typeface="Roboto"/>
+              </a:rPr>
+              <a:t> </a:t>
+            </a:r>
+            <a:r>
+              <a:rPr lang="pl" sz="600" dirty="0">
+                <a:latin typeface="Roboto"/>
+                <a:ea typeface="Roboto"/>
+                <a:cs typeface="Roboto"/>
+                <a:sym typeface="Roboto"/>
+              </a:rPr>
+              <a:t>: https://www.casfera.pl/</a:t>
+            </a:r>
+            <a:endParaRPr sz="600" dirty="0">
               <a:latin typeface="Roboto"/>
               <a:ea typeface="Roboto"/>
               <a:cs typeface="Roboto"/>
@@ -9204,14 +10136,6 @@
             </a:r>
             <a:r>
               <a:rPr lang="pl-PL" dirty="0" err="1"/>
-              <a:t>accurately</a:t>
-            </a:r>
-            <a:r>
-              <a:rPr lang="pl-PL" dirty="0"/>
-              <a:t> </a:t>
-            </a:r>
-            <a:r>
-              <a:rPr lang="pl-PL" dirty="0" err="1"/>
               <a:t>detects</a:t>
             </a:r>
             <a:r>
@@ -9416,7 +10340,7 @@
               <a:buNone/>
             </a:pPr>
             <a:r>
-              <a:rPr lang="pl" sz="600">
+              <a:rPr lang="pl" sz="600" dirty="0">
                 <a:solidFill>
                   <a:schemeClr val="lt1"/>
                 </a:solidFill>
@@ -9425,9 +10349,9 @@
                 <a:cs typeface="Roboto"/>
                 <a:sym typeface="Roboto"/>
               </a:rPr>
-              <a:t>żródło: https://pixabay.com/</a:t>
-            </a:r>
-            <a:endParaRPr sz="600">
+              <a:t>source : https://pixabay.com/</a:t>
+            </a:r>
+            <a:endParaRPr sz="600" dirty="0">
               <a:solidFill>
                 <a:schemeClr val="lt1"/>
               </a:solidFill>
@@ -9778,15 +10702,41 @@
               <a:buNone/>
             </a:pPr>
             <a:r>
-              <a:rPr lang="pl" sz="600">
+              <a:rPr lang="pl" sz="600" dirty="0">
+                <a:solidFill>
+                  <a:schemeClr val="bg2">
+                    <a:lumMod val="50000"/>
+                  </a:schemeClr>
+                </a:solidFill>
                 <a:latin typeface="Roboto"/>
                 <a:ea typeface="Roboto"/>
                 <a:cs typeface="Roboto"/>
                 <a:sym typeface="Roboto"/>
               </a:rPr>
-              <a:t>źródło: https://www.reddit.com/</a:t>
-            </a:r>
-            <a:endParaRPr sz="600">
+              <a:t>source</a:t>
+            </a:r>
+            <a:r>
+              <a:rPr lang="pl" sz="600" dirty="0">
+                <a:solidFill>
+                  <a:schemeClr val="lt1"/>
+                </a:solidFill>
+                <a:latin typeface="Roboto"/>
+                <a:ea typeface="Roboto"/>
+                <a:cs typeface="Roboto"/>
+                <a:sym typeface="Roboto"/>
+              </a:rPr>
+              <a:t> </a:t>
+            </a:r>
+            <a:r>
+              <a:rPr lang="pl" sz="600" dirty="0">
+                <a:latin typeface="Roboto"/>
+                <a:ea typeface="Roboto"/>
+                <a:cs typeface="Roboto"/>
+                <a:sym typeface="Roboto"/>
+              </a:rPr>
+              <a:t>: https://www.reddit.com/</a:t>
+            </a:r>
+            <a:endParaRPr sz="600" dirty="0">
               <a:latin typeface="Roboto"/>
               <a:ea typeface="Roboto"/>
               <a:cs typeface="Roboto"/>
@@ -10022,8 +10972,8 @@
               <a:buChar char="•"/>
             </a:pPr>
             <a:r>
-              <a:rPr lang="en-US" dirty="0"/>
-              <a:t>I</a:t>
+              <a:rPr lang="pl-PL" dirty="0"/>
+              <a:t>i</a:t>
             </a:r>
             <a:r>
               <a:rPr lang="pl" dirty="0"/>
@@ -10096,7 +11046,7 @@
               <a:buNone/>
             </a:pPr>
             <a:r>
-              <a:rPr lang="pl" sz="600">
+              <a:rPr lang="pl" sz="600" dirty="0">
                 <a:solidFill>
                   <a:schemeClr val="lt1"/>
                 </a:solidFill>
@@ -10105,9 +11055,9 @@
                 <a:cs typeface="Roboto"/>
                 <a:sym typeface="Roboto"/>
               </a:rPr>
-              <a:t>źródło: https://www.surveyrock.com/</a:t>
-            </a:r>
-            <a:endParaRPr sz="600">
+              <a:t>source : https://www.surveyrock.com/</a:t>
+            </a:r>
+            <a:endParaRPr sz="600" dirty="0">
               <a:solidFill>
                 <a:schemeClr val="lt1"/>
               </a:solidFill>
@@ -10160,7 +11110,7 @@
         <p:spPr>
           <a:xfrm>
             <a:off x="311700" y="410000"/>
-            <a:ext cx="8520600" cy="607800"/>
+            <a:ext cx="3600450" cy="607800"/>
           </a:xfrm>
           <a:prstGeom prst="rect">
             <a:avLst/>
@@ -10182,10 +11132,10 @@
               <a:buNone/>
             </a:pPr>
             <a:r>
-              <a:rPr lang="pl"/>
-              <a:t>Wyniki</a:t>
-            </a:r>
-            <a:endParaRPr/>
+              <a:rPr lang="pl" dirty="0"/>
+              <a:t>Our Project on charts</a:t>
+            </a:r>
+            <a:endParaRPr dirty="0"/>
           </a:p>
         </p:txBody>
       </p:sp>
@@ -10201,8 +11151,8 @@
         </p:nvSpPr>
         <p:spPr>
           <a:xfrm>
-            <a:off x="311700" y="1229875"/>
-            <a:ext cx="8520600" cy="3339000"/>
+            <a:off x="311700" y="1777721"/>
+            <a:ext cx="3600450" cy="428954"/>
           </a:xfrm>
           <a:prstGeom prst="rect">
             <a:avLst/>
@@ -10210,7 +11160,7 @@
         </p:spPr>
         <p:txBody>
           <a:bodyPr spcFirstLastPara="1" wrap="square" lIns="91425" tIns="91425" rIns="91425" bIns="91425" anchor="t" anchorCtr="0">
-            <a:normAutofit/>
+            <a:noAutofit/>
           </a:bodyPr>
           <a:lstStyle/>
           <a:p>
@@ -10223,10 +11173,90 @@
               </a:spcAft>
               <a:buNone/>
             </a:pPr>
-            <a:endParaRPr/>
+            <a:r>
+              <a:rPr lang="pl-PL" sz="1600" dirty="0" err="1"/>
+              <a:t>Artificial</a:t>
+            </a:r>
+            <a:r>
+              <a:rPr lang="pl-PL" sz="1600" dirty="0"/>
+              <a:t> </a:t>
+            </a:r>
+            <a:r>
+              <a:rPr lang="pl-PL" sz="1600" dirty="0" err="1"/>
+              <a:t>intelligence</a:t>
+            </a:r>
+            <a:r>
+              <a:rPr lang="pl-PL" sz="1600" dirty="0"/>
+              <a:t> </a:t>
+            </a:r>
+            <a:r>
+              <a:rPr lang="pl-PL" sz="1600" dirty="0" err="1"/>
+              <a:t>accuracy</a:t>
+            </a:r>
+            <a:endParaRPr sz="1600" dirty="0"/>
           </a:p>
         </p:txBody>
       </p:sp>
+      <p:pic>
+        <p:nvPicPr>
+          <p:cNvPr id="3" name="Obraz 2">
+            <a:extLst>
+              <a:ext uri="{FF2B5EF4-FFF2-40B4-BE49-F238E27FC236}">
+                <a16:creationId xmlns:a16="http://schemas.microsoft.com/office/drawing/2014/main" id="{526912D5-3692-C7F0-64A4-5879172D9BCF}"/>
+              </a:ext>
+            </a:extLst>
+          </p:cNvPr>
+          <p:cNvPicPr>
+            <a:picLocks noChangeAspect="1"/>
+          </p:cNvPicPr>
+          <p:nvPr/>
+        </p:nvPicPr>
+        <p:blipFill>
+          <a:blip r:embed="rId3"/>
+          <a:stretch>
+            <a:fillRect/>
+          </a:stretch>
+        </p:blipFill>
+        <p:spPr>
+          <a:xfrm>
+            <a:off x="311700" y="2206675"/>
+            <a:ext cx="3600450" cy="2362200"/>
+          </a:xfrm>
+          <a:prstGeom prst="rect">
+            <a:avLst/>
+          </a:prstGeom>
+        </p:spPr>
+      </p:pic>
+      <p:graphicFrame>
+        <p:nvGraphicFramePr>
+          <p:cNvPr id="5" name="Wykres 4">
+            <a:extLst>
+              <a:ext uri="{FF2B5EF4-FFF2-40B4-BE49-F238E27FC236}">
+                <a16:creationId xmlns:a16="http://schemas.microsoft.com/office/drawing/2014/main" id="{A52550F8-D657-AFAA-08AA-0B2E0D9D658C}"/>
+              </a:ext>
+            </a:extLst>
+          </p:cNvPr>
+          <p:cNvGraphicFramePr>
+            <a:graphicFrameLocks/>
+          </p:cNvGraphicFramePr>
+          <p:nvPr>
+            <p:extLst>
+              <p:ext uri="{D42A27DB-BD31-4B8C-83A1-F6EECF244321}">
+                <p14:modId xmlns:p14="http://schemas.microsoft.com/office/powerpoint/2010/main" val="168611158"/>
+              </p:ext>
+            </p:extLst>
+          </p:nvPr>
+        </p:nvGraphicFramePr>
+        <p:xfrm>
+          <a:off x="4995746" y="410000"/>
+          <a:ext cx="3836554" cy="2362200"/>
+        </p:xfrm>
+        <a:graphic>
+          <a:graphicData uri="http://schemas.openxmlformats.org/drawingml/2006/chart">
+            <c:chart xmlns:c="http://schemas.openxmlformats.org/drawingml/2006/chart" xmlns:r="http://schemas.openxmlformats.org/officeDocument/2006/relationships" r:id="rId4"/>
+          </a:graphicData>
+        </a:graphic>
+      </p:graphicFrame>
     </p:spTree>
   </p:cSld>
   <p:clrMapOvr>
@@ -10537,6 +11567,70 @@
           </a:extLst>
         </p:spPr>
       </p:pic>
+      <p:sp>
+        <p:nvSpPr>
+          <p:cNvPr id="3" name="pole tekstowe 2">
+            <a:extLst>
+              <a:ext uri="{FF2B5EF4-FFF2-40B4-BE49-F238E27FC236}">
+                <a16:creationId xmlns:a16="http://schemas.microsoft.com/office/drawing/2014/main" id="{E441F6BF-8CD2-84AA-EC34-C4E49FFCE556}"/>
+              </a:ext>
+            </a:extLst>
+          </p:cNvPr>
+          <p:cNvSpPr txBox="1"/>
+          <p:nvPr/>
+        </p:nvSpPr>
+        <p:spPr>
+          <a:xfrm>
+            <a:off x="7369791" y="3909403"/>
+            <a:ext cx="1812908" cy="184666"/>
+          </a:xfrm>
+          <a:prstGeom prst="rect">
+            <a:avLst/>
+          </a:prstGeom>
+          <a:noFill/>
+        </p:spPr>
+        <p:txBody>
+          <a:bodyPr wrap="square">
+            <a:spAutoFit/>
+          </a:bodyPr>
+          <a:lstStyle/>
+          <a:p>
+            <a:pPr marL="0" lvl="0" indent="0" algn="r" rtl="0">
+              <a:spcBef>
+                <a:spcPts val="0"/>
+              </a:spcBef>
+              <a:spcAft>
+                <a:spcPts val="0"/>
+              </a:spcAft>
+              <a:buNone/>
+            </a:pPr>
+            <a:r>
+              <a:rPr lang="pl-PL" sz="600" dirty="0" err="1">
+                <a:solidFill>
+                  <a:schemeClr val="lt1"/>
+                </a:solidFill>
+                <a:latin typeface="Roboto"/>
+                <a:ea typeface="Roboto"/>
+                <a:cs typeface="Roboto"/>
+                <a:sym typeface="Roboto"/>
+              </a:rPr>
+              <a:t>source</a:t>
+            </a:r>
+            <a:r>
+              <a:rPr lang="pl-PL" sz="600" dirty="0">
+                <a:solidFill>
+                  <a:schemeClr val="lt1"/>
+                </a:solidFill>
+                <a:latin typeface="Roboto"/>
+                <a:ea typeface="Roboto"/>
+                <a:cs typeface="Roboto"/>
+                <a:sym typeface="Roboto"/>
+              </a:rPr>
+              <a:t>: https://blog.masterdataaficionado.com</a:t>
+            </a:r>
+          </a:p>
+        </p:txBody>
+      </p:sp>
     </p:spTree>
   </p:cSld>
   <p:clrMapOvr>

</xml_diff>

<commit_message>
version next - new charts
</commit_message>
<xml_diff>
--- a/beHappy in English.pptx
+++ b/beHappy in English.pptx
@@ -311,33 +311,60 @@
             <a:pPr>
               <a:defRPr sz="1400" b="0" i="0" u="none" strike="noStrike" kern="1200" spc="0" baseline="0">
                 <a:solidFill>
-                  <a:schemeClr val="tx1">
-                    <a:lumMod val="65000"/>
-                    <a:lumOff val="35000"/>
-                  </a:schemeClr>
-                </a:solidFill>
-                <a:latin typeface="+mn-lt"/>
+                  <a:schemeClr val="bg2"/>
+                </a:solidFill>
+                <a:latin typeface="Roboto" panose="02000000000000000000" pitchFamily="2" charset="0"/>
                 <a:ea typeface="+mn-ea"/>
                 <a:cs typeface="+mn-cs"/>
               </a:defRPr>
             </a:pPr>
             <a:r>
-              <a:rPr lang="pl-PL" baseline="0" dirty="0"/>
+              <a:rPr lang="pl-PL" sz="1800" b="0" i="0" baseline="0" dirty="0">
+                <a:solidFill>
+                  <a:schemeClr val="bg2"/>
+                </a:solidFill>
+                <a:effectLst/>
+                <a:latin typeface="Roboto" panose="02000000000000000000" pitchFamily="2" charset="0"/>
+              </a:rPr>
               <a:t>Ratio of data </a:t>
             </a:r>
             <a:r>
-              <a:rPr lang="pl-PL" baseline="0" dirty="0" err="1"/>
+              <a:rPr lang="pl-PL" sz="1800" b="0" i="0" baseline="0" dirty="0" err="1">
+                <a:solidFill>
+                  <a:schemeClr val="bg2"/>
+                </a:solidFill>
+                <a:effectLst/>
+                <a:latin typeface="Roboto" panose="02000000000000000000" pitchFamily="2" charset="0"/>
+              </a:rPr>
               <a:t>used</a:t>
             </a:r>
             <a:r>
-              <a:rPr lang="pl-PL" baseline="0" dirty="0"/>
+              <a:rPr lang="pl-PL" sz="1800" b="0" i="0" baseline="0" dirty="0">
+                <a:solidFill>
+                  <a:schemeClr val="bg2"/>
+                </a:solidFill>
+                <a:effectLst/>
+                <a:latin typeface="Roboto" panose="02000000000000000000" pitchFamily="2" charset="0"/>
+              </a:rPr>
               <a:t> in AI </a:t>
             </a:r>
             <a:r>
-              <a:rPr lang="pl-PL" baseline="0" dirty="0" err="1"/>
+              <a:rPr lang="pl-PL" sz="1800" b="0" i="0" baseline="0" dirty="0" err="1">
+                <a:solidFill>
+                  <a:schemeClr val="bg2"/>
+                </a:solidFill>
+                <a:effectLst/>
+                <a:latin typeface="Roboto" panose="02000000000000000000" pitchFamily="2" charset="0"/>
+              </a:rPr>
               <a:t>teaching</a:t>
             </a:r>
-            <a:endParaRPr lang="pl-PL" baseline="0" dirty="0"/>
+            <a:endParaRPr lang="pl-PL" baseline="0" dirty="0">
+              <a:solidFill>
+                <a:schemeClr val="bg2"/>
+              </a:solidFill>
+              <a:effectLst/>
+              <a:latin typeface="Roboto" panose="02000000000000000000" pitchFamily="2" charset="0"/>
+            </a:endParaRPr>
           </a:p>
         </c:rich>
       </c:tx>
@@ -356,17 +383,14 @@
           <a:pPr>
             <a:defRPr sz="1400" b="0" i="0" u="none" strike="noStrike" kern="1200" spc="0" baseline="0">
               <a:solidFill>
-                <a:schemeClr val="tx1">
-                  <a:lumMod val="65000"/>
-                  <a:lumOff val="35000"/>
-                </a:schemeClr>
+                <a:schemeClr val="bg2"/>
               </a:solidFill>
-              <a:latin typeface="+mn-lt"/>
+              <a:latin typeface="Roboto" panose="02000000000000000000" pitchFamily="2" charset="0"/>
               <a:ea typeface="+mn-ea"/>
               <a:cs typeface="+mn-cs"/>
             </a:defRPr>
           </a:pPr>
-          <a:endParaRPr lang="en-US"/>
+          <a:endParaRPr lang="pl-PL"/>
         </a:p>
       </c:txPr>
     </c:title>
@@ -382,7 +406,7 @@
           <c:order val="0"/>
           <c:spPr>
             <a:solidFill>
-              <a:schemeClr val="accent2"/>
+              <a:srgbClr val="FF3F3F"/>
             </a:solidFill>
             <a:ln>
               <a:noFill/>
@@ -390,25 +414,6 @@
             <a:effectLst/>
           </c:spPr>
           <c:invertIfNegative val="0"/>
-          <c:dPt>
-            <c:idx val="0"/>
-            <c:invertIfNegative val="0"/>
-            <c:bubble3D val="0"/>
-            <c:spPr>
-              <a:solidFill>
-                <a:srgbClr val="EF3F3F"/>
-              </a:solidFill>
-              <a:ln>
-                <a:noFill/>
-              </a:ln>
-              <a:effectLst/>
-            </c:spPr>
-            <c:extLst>
-              <c:ext xmlns:c16="http://schemas.microsoft.com/office/drawing/2014/chart" uri="{C3380CC4-5D6E-409C-BE32-E72D297353CC}">
-                <c16:uniqueId val="{00000005-B26F-459E-A047-7E8F89823FD3}"/>
-              </c:ext>
-            </c:extLst>
-          </c:dPt>
           <c:dPt>
             <c:idx val="1"/>
             <c:invertIfNegative val="0"/>
@@ -424,7 +429,7 @@
             </c:spPr>
             <c:extLst>
               <c:ext xmlns:c16="http://schemas.microsoft.com/office/drawing/2014/chart" uri="{C3380CC4-5D6E-409C-BE32-E72D297353CC}">
-                <c16:uniqueId val="{00000001-B26F-459E-A047-7E8F89823FD3}"/>
+                <c16:uniqueId val="{00000001-72DD-4179-A8F6-2F0F00C709D2}"/>
               </c:ext>
             </c:extLst>
           </c:dPt>
@@ -434,10 +439,10 @@
               <c:strCache>
                 <c:ptCount val="2"/>
                 <c:pt idx="0">
-                  <c:v>Toskyczne</c:v>
+                  <c:v>Toxic</c:v>
                 </c:pt>
                 <c:pt idx="1">
-                  <c:v>Nietoksyczne</c:v>
+                  <c:v>Neutral</c:v>
                 </c:pt>
               </c:strCache>
             </c:strRef>
@@ -459,7 +464,7 @@
           </c:val>
           <c:extLst>
             <c:ext xmlns:c16="http://schemas.microsoft.com/office/drawing/2014/chart" uri="{C3380CC4-5D6E-409C-BE32-E72D297353CC}">
-              <c16:uniqueId val="{00000002-B26F-459E-A047-7E8F89823FD3}"/>
+              <c16:uniqueId val="{00000002-72DD-4179-A8F6-2F0F00C709D2}"/>
             </c:ext>
           </c:extLst>
         </c:ser>
@@ -514,7 +519,7 @@
                 <a:cs typeface="+mn-cs"/>
               </a:defRPr>
             </a:pPr>
-            <a:endParaRPr lang="en-US"/>
+            <a:endParaRPr lang="pl-PL"/>
           </a:p>
         </c:txPr>
         <c:crossAx val="450259336"/>
@@ -570,7 +575,7 @@
                 <a:cs typeface="+mn-cs"/>
               </a:defRPr>
             </a:pPr>
-            <a:endParaRPr lang="en-US"/>
+            <a:endParaRPr lang="pl-PL"/>
           </a:p>
         </c:txPr>
         <c:crossAx val="450258680"/>
@@ -603,7 +608,7 @@
       <a:pPr>
         <a:defRPr/>
       </a:pPr>
-      <a:endParaRPr lang="en-US"/>
+      <a:endParaRPr lang="pl-PL"/>
     </a:p>
   </c:txPr>
   <c:externalData r:id="rId3">
@@ -11229,7 +11234,7 @@
       </p:pic>
       <p:graphicFrame>
         <p:nvGraphicFramePr>
-          <p:cNvPr id="5" name="Wykres 4">
+          <p:cNvPr id="2" name="Wykres 1">
             <a:extLst>
               <a:ext uri="{FF2B5EF4-FFF2-40B4-BE49-F238E27FC236}">
                 <a16:creationId xmlns:a16="http://schemas.microsoft.com/office/drawing/2014/main" id="{A52550F8-D657-AFAA-08AA-0B2E0D9D658C}"/>
@@ -11242,14 +11247,14 @@
           <p:nvPr>
             <p:extLst>
               <p:ext uri="{D42A27DB-BD31-4B8C-83A1-F6EECF244321}">
-                <p14:modId xmlns:p14="http://schemas.microsoft.com/office/powerpoint/2010/main" val="168611158"/>
+                <p14:modId xmlns:p14="http://schemas.microsoft.com/office/powerpoint/2010/main" val="1477453442"/>
               </p:ext>
             </p:extLst>
           </p:nvPr>
         </p:nvGraphicFramePr>
         <p:xfrm>
-          <a:off x="4995746" y="410000"/>
-          <a:ext cx="3836554" cy="2362200"/>
+          <a:off x="5231852" y="410000"/>
+          <a:ext cx="3600450" cy="2362201"/>
         </p:xfrm>
         <a:graphic>
           <a:graphicData uri="http://schemas.openxmlformats.org/drawingml/2006/chart">

</xml_diff>